<commit_message>
express project ppt fix
</commit_message>
<xml_diff>
--- a/ExpressProjects/ExpressProjects.pptx
+++ b/ExpressProjects/ExpressProjects.pptx
@@ -212,7 +212,7 @@
           <a:p>
             <a:fld id="{19104133-B5B0-4351-8158-4F0E5EB1E2BF}" type="datetimeFigureOut">
               <a:rPr lang="en-US" smtClean="0"/>
-              <a:t>1/13/2020</a:t>
+              <a:t>2/4/2020</a:t>
             </a:fld>
             <a:endParaRPr lang="en-US"/>
           </a:p>
@@ -958,7 +958,7 @@
             <a:fld id="{1C2D31DE-C454-491C-B5C3-F097855E3DF7}" type="datetime4">
               <a:rPr lang="en-US" smtClean="0"/>
               <a:pPr/>
-              <a:t>January 13, 2020</a:t>
+              <a:t>February 4, 2020</a:t>
             </a:fld>
             <a:endParaRPr lang="en-US" dirty="0"/>
           </a:p>
@@ -4358,7 +4358,7 @@
           <a:p>
             <a:fld id="{5958763E-B898-436D-883D-03711491D54A}" type="datetimeFigureOut">
               <a:rPr lang="en-US" smtClean="0"/>
-              <a:t>1/13/2020</a:t>
+              <a:t>2/4/2020</a:t>
             </a:fld>
             <a:endParaRPr lang="en-US"/>
           </a:p>
@@ -4559,7 +4559,7 @@
           <a:p>
             <a:fld id="{5958763E-B898-436D-883D-03711491D54A}" type="datetimeFigureOut">
               <a:rPr lang="en-US" smtClean="0"/>
-              <a:t>1/13/2020</a:t>
+              <a:t>2/4/2020</a:t>
             </a:fld>
             <a:endParaRPr lang="en-US"/>
           </a:p>
@@ -4816,7 +4816,7 @@
           <a:p>
             <a:fld id="{5958763E-B898-436D-883D-03711491D54A}" type="datetimeFigureOut">
               <a:rPr lang="en-US" smtClean="0"/>
-              <a:t>1/13/2020</a:t>
+              <a:t>2/4/2020</a:t>
             </a:fld>
             <a:endParaRPr lang="en-US"/>
           </a:p>
@@ -5171,7 +5171,7 @@
           <a:p>
             <a:fld id="{5958763E-B898-436D-883D-03711491D54A}" type="datetimeFigureOut">
               <a:rPr lang="en-US" smtClean="0"/>
-              <a:t>1/13/2020</a:t>
+              <a:t>2/4/2020</a:t>
             </a:fld>
             <a:endParaRPr lang="en-US"/>
           </a:p>
@@ -5594,7 +5594,7 @@
           <a:p>
             <a:fld id="{5958763E-B898-436D-883D-03711491D54A}" type="datetimeFigureOut">
               <a:rPr lang="en-US" smtClean="0"/>
-              <a:t>1/13/2020</a:t>
+              <a:t>2/4/2020</a:t>
             </a:fld>
             <a:endParaRPr lang="en-US"/>
           </a:p>
@@ -6102,7 +6102,7 @@
           <a:p>
             <a:fld id="{5958763E-B898-436D-883D-03711491D54A}" type="datetimeFigureOut">
               <a:rPr lang="en-US" smtClean="0"/>
-              <a:t>1/13/2020</a:t>
+              <a:t>2/4/2020</a:t>
             </a:fld>
             <a:endParaRPr lang="en-US"/>
           </a:p>
@@ -6560,7 +6560,7 @@
           <a:p>
             <a:fld id="{5958763E-B898-436D-883D-03711491D54A}" type="datetimeFigureOut">
               <a:rPr lang="en-US" smtClean="0"/>
-              <a:t>1/13/2020</a:t>
+              <a:t>2/4/2020</a:t>
             </a:fld>
             <a:endParaRPr lang="en-US"/>
           </a:p>
@@ -7178,7 +7178,7 @@
           <a:p>
             <a:fld id="{5958763E-B898-436D-883D-03711491D54A}" type="datetimeFigureOut">
               <a:rPr lang="en-US" smtClean="0"/>
-              <a:t>1/13/2020</a:t>
+              <a:t>2/4/2020</a:t>
             </a:fld>
             <a:endParaRPr lang="en-US"/>
           </a:p>
@@ -7956,7 +7956,7 @@
           <a:p>
             <a:fld id="{5958763E-B898-436D-883D-03711491D54A}" type="datetimeFigureOut">
               <a:rPr lang="en-US" smtClean="0"/>
-              <a:t>1/13/2020</a:t>
+              <a:t>2/4/2020</a:t>
             </a:fld>
             <a:endParaRPr lang="en-US"/>
           </a:p>
@@ -8067,7 +8067,7 @@
           <a:p>
             <a:fld id="{5958763E-B898-436D-883D-03711491D54A}" type="datetimeFigureOut">
               <a:rPr lang="en-US" smtClean="0"/>
-              <a:t>1/13/2020</a:t>
+              <a:t>2/4/2020</a:t>
             </a:fld>
             <a:endParaRPr lang="en-US"/>
           </a:p>
@@ -8409,7 +8409,7 @@
             <a:fld id="{1C2D31DE-C454-491C-B5C3-F097855E3DF7}" type="datetime4">
               <a:rPr lang="en-US" smtClean="0"/>
               <a:pPr/>
-              <a:t>January 13, 2020</a:t>
+              <a:t>February 4, 2020</a:t>
             </a:fld>
             <a:endParaRPr lang="en-US" dirty="0"/>
           </a:p>
@@ -11569,7 +11569,7 @@
           <a:p>
             <a:fld id="{5958763E-B898-436D-883D-03711491D54A}" type="datetimeFigureOut">
               <a:rPr lang="en-US" smtClean="0"/>
-              <a:t>1/13/2020</a:t>
+              <a:t>2/4/2020</a:t>
             </a:fld>
             <a:endParaRPr lang="en-US"/>
           </a:p>
@@ -11700,7 +11700,7 @@
           <a:p>
             <a:fld id="{5958763E-B898-436D-883D-03711491D54A}" type="datetimeFigureOut">
               <a:rPr lang="en-US" smtClean="0"/>
-              <a:t>1/13/2020</a:t>
+              <a:t>2/4/2020</a:t>
             </a:fld>
             <a:endParaRPr lang="en-US"/>
           </a:p>
@@ -11831,7 +11831,7 @@
           <a:p>
             <a:fld id="{5958763E-B898-436D-883D-03711491D54A}" type="datetimeFigureOut">
               <a:rPr lang="en-US" smtClean="0"/>
-              <a:t>1/13/2020</a:t>
+              <a:t>2/4/2020</a:t>
             </a:fld>
             <a:endParaRPr lang="en-US"/>
           </a:p>
@@ -11962,7 +11962,7 @@
           <a:p>
             <a:fld id="{5958763E-B898-436D-883D-03711491D54A}" type="datetimeFigureOut">
               <a:rPr lang="en-US" smtClean="0"/>
-              <a:t>1/13/2020</a:t>
+              <a:t>2/4/2020</a:t>
             </a:fld>
             <a:endParaRPr lang="en-US"/>
           </a:p>
@@ -12093,7 +12093,7 @@
           <a:p>
             <a:fld id="{5958763E-B898-436D-883D-03711491D54A}" type="datetimeFigureOut">
               <a:rPr lang="en-US" smtClean="0"/>
-              <a:t>1/13/2020</a:t>
+              <a:t>2/4/2020</a:t>
             </a:fld>
             <a:endParaRPr lang="en-US"/>
           </a:p>
@@ -12224,7 +12224,7 @@
           <a:p>
             <a:fld id="{5958763E-B898-436D-883D-03711491D54A}" type="datetimeFigureOut">
               <a:rPr lang="en-US" smtClean="0"/>
-              <a:t>1/13/2020</a:t>
+              <a:t>2/4/2020</a:t>
             </a:fld>
             <a:endParaRPr lang="en-US"/>
           </a:p>
@@ -12355,7 +12355,7 @@
           <a:p>
             <a:fld id="{5958763E-B898-436D-883D-03711491D54A}" type="datetimeFigureOut">
               <a:rPr lang="en-US" smtClean="0"/>
-              <a:t>1/13/2020</a:t>
+              <a:t>2/4/2020</a:t>
             </a:fld>
             <a:endParaRPr lang="en-US"/>
           </a:p>
@@ -12486,7 +12486,7 @@
           <a:p>
             <a:fld id="{5958763E-B898-436D-883D-03711491D54A}" type="datetimeFigureOut">
               <a:rPr lang="en-US" smtClean="0"/>
-              <a:t>1/13/2020</a:t>
+              <a:t>2/4/2020</a:t>
             </a:fld>
             <a:endParaRPr lang="en-US"/>
           </a:p>
@@ -12626,7 +12626,7 @@
           <a:p>
             <a:fld id="{5958763E-B898-436D-883D-03711491D54A}" type="datetimeFigureOut">
               <a:rPr lang="en-US" smtClean="0"/>
-              <a:t>1/13/2020</a:t>
+              <a:t>2/4/2020</a:t>
             </a:fld>
             <a:endParaRPr lang="en-US"/>
           </a:p>
@@ -15987,7 +15987,7 @@
             <a:fld id="{1C2D31DE-C454-491C-B5C3-F097855E3DF7}" type="datetime4">
               <a:rPr lang="en-US" smtClean="0"/>
               <a:pPr/>
-              <a:t>January 13, 2020</a:t>
+              <a:t>February 4, 2020</a:t>
             </a:fld>
             <a:endParaRPr lang="en-US" dirty="0"/>
           </a:p>
@@ -28232,7 +28232,7 @@
           <a:p>
             <a:fld id="{5958763E-B898-436D-883D-03711491D54A}" type="datetimeFigureOut">
               <a:rPr lang="en-US" smtClean="0"/>
-              <a:t>1/13/2020</a:t>
+              <a:t>2/4/2020</a:t>
             </a:fld>
             <a:endParaRPr lang="en-US"/>
           </a:p>
@@ -28641,7 +28641,7 @@
           <a:p>
             <a:fld id="{5958763E-B898-436D-883D-03711491D54A}" type="datetimeFigureOut">
               <a:rPr lang="en-US" smtClean="0"/>
-              <a:t>1/13/2020</a:t>
+              <a:t>2/4/2020</a:t>
             </a:fld>
             <a:endParaRPr lang="en-US"/>
           </a:p>
@@ -28942,7 +28942,7 @@
           <a:p>
             <a:fld id="{5958763E-B898-436D-883D-03711491D54A}" type="datetimeFigureOut">
               <a:rPr lang="en-US" smtClean="0"/>
-              <a:t>1/13/2020</a:t>
+              <a:t>2/4/2020</a:t>
             </a:fld>
             <a:endParaRPr lang="en-US"/>
           </a:p>
@@ -29150,7 +29150,7 @@
           <a:p>
             <a:fld id="{5958763E-B898-436D-883D-03711491D54A}" type="datetimeFigureOut">
               <a:rPr lang="en-US" smtClean="0"/>
-              <a:t>1/13/2020</a:t>
+              <a:t>2/4/2020</a:t>
             </a:fld>
             <a:endParaRPr lang="en-US"/>
           </a:p>
@@ -29418,7 +29418,7 @@
           <a:p>
             <a:fld id="{5958763E-B898-436D-883D-03711491D54A}" type="datetimeFigureOut">
               <a:rPr lang="en-US" smtClean="0"/>
-              <a:t>1/13/2020</a:t>
+              <a:t>2/4/2020</a:t>
             </a:fld>
             <a:endParaRPr lang="en-US"/>
           </a:p>
@@ -29935,7 +29935,7 @@
           <a:p>
             <a:fld id="{5958763E-B898-436D-883D-03711491D54A}" type="datetimeFigureOut">
               <a:rPr lang="en-US" smtClean="0"/>
-              <a:t>1/13/2020</a:t>
+              <a:t>2/4/2020</a:t>
             </a:fld>
             <a:endParaRPr lang="en-US"/>
           </a:p>
@@ -30423,7 +30423,7 @@
           <a:p>
             <a:fld id="{5958763E-B898-436D-883D-03711491D54A}" type="datetimeFigureOut">
               <a:rPr lang="en-US" smtClean="0"/>
-              <a:t>1/13/2020</a:t>
+              <a:t>2/4/2020</a:t>
             </a:fld>
             <a:endParaRPr lang="en-US"/>
           </a:p>
@@ -31249,7 +31249,7 @@
           <a:p>
             <a:fld id="{5958763E-B898-436D-883D-03711491D54A}" type="datetimeFigureOut">
               <a:rPr lang="en-US" smtClean="0"/>
-              <a:t>1/13/2020</a:t>
+              <a:t>2/4/2020</a:t>
             </a:fld>
             <a:endParaRPr lang="en-US"/>
           </a:p>
@@ -31457,7 +31457,7 @@
           <a:p>
             <a:fld id="{5958763E-B898-436D-883D-03711491D54A}" type="datetimeFigureOut">
               <a:rPr lang="en-US" smtClean="0"/>
-              <a:t>1/13/2020</a:t>
+              <a:t>2/4/2020</a:t>
             </a:fld>
             <a:endParaRPr lang="en-US"/>
           </a:p>
@@ -31799,7 +31799,7 @@
           <a:p>
             <a:fld id="{5958763E-B898-436D-883D-03711491D54A}" type="datetimeFigureOut">
               <a:rPr lang="en-US" smtClean="0"/>
-              <a:t>1/13/2020</a:t>
+              <a:t>2/4/2020</a:t>
             </a:fld>
             <a:endParaRPr lang="en-US"/>
           </a:p>
@@ -32036,7 +32036,7 @@
           <a:p>
             <a:fld id="{5958763E-B898-436D-883D-03711491D54A}" type="datetimeFigureOut">
               <a:rPr lang="en-US" smtClean="0"/>
-              <a:t>1/13/2020</a:t>
+              <a:t>2/4/2020</a:t>
             </a:fld>
             <a:endParaRPr lang="en-US"/>
           </a:p>
@@ -32287,7 +32287,7 @@
           <a:p>
             <a:fld id="{5958763E-B898-436D-883D-03711491D54A}" type="datetimeFigureOut">
               <a:rPr lang="en-US" smtClean="0"/>
-              <a:t>1/13/2020</a:t>
+              <a:t>2/4/2020</a:t>
             </a:fld>
             <a:endParaRPr lang="en-US"/>
           </a:p>
@@ -35915,7 +35915,6 @@
               <a:rPr lang="en-US" dirty="0" smtClean="0"/>
               <a:t>Express</a:t>
             </a:r>
-            <a:endParaRPr lang="en-US" dirty="0" smtClean="0"/>
           </a:p>
         </p:txBody>
       </p:sp>
@@ -36831,8 +36830,29 @@
                 </a:solidFill>
                 <a:latin typeface="Consolas" panose="020B0609020204030204" pitchFamily="49" charset="0"/>
               </a:rPr>
-              <a:t> install express –save</a:t>
+              <a:t> install express </a:t>
             </a:r>
+            <a:r>
+              <a:rPr lang="en-US" sz="3600" b="1" dirty="0" smtClean="0">
+                <a:solidFill>
+                  <a:schemeClr val="accent1">
+                    <a:lumMod val="40000"/>
+                    <a:lumOff val="60000"/>
+                  </a:schemeClr>
+                </a:solidFill>
+                <a:latin typeface="Consolas" panose="020B0609020204030204" pitchFamily="49" charset="0"/>
+              </a:rPr>
+              <a:t>–-save</a:t>
+            </a:r>
+            <a:endParaRPr lang="en-US" sz="3600" b="1" dirty="0" smtClean="0">
+              <a:solidFill>
+                <a:schemeClr val="accent1">
+                  <a:lumMod val="40000"/>
+                  <a:lumOff val="60000"/>
+                </a:schemeClr>
+              </a:solidFill>
+              <a:latin typeface="Consolas" panose="020B0609020204030204" pitchFamily="49" charset="0"/>
+            </a:endParaRPr>
           </a:p>
           <a:p>
             <a:pPr lvl="1"/>

</xml_diff>